<commit_message>
legends, axis, points bigger.
</commit_message>
<xml_diff>
--- a/CLCE Poster Files/Taylor, Emily_UrbanStreams_CLCE.pptx
+++ b/CLCE Poster Files/Taylor, Emily_UrbanStreams_CLCE.pptx
@@ -6545,7 +6545,7 @@
         <p:spPr bwMode="auto">
           <a:xfrm>
             <a:off x="31089600" y="28803600"/>
-            <a:ext cx="11887200" cy="1631216"/>
+            <a:ext cx="11887200" cy="400110"/>
           </a:xfrm>
           <a:prstGeom prst="rect">
             <a:avLst/>
@@ -6692,47 +6692,20 @@
               </a:spcBef>
             </a:pPr>
             <a:r>
-              <a:rPr lang="en-US" altLang="en-US" sz="2000" dirty="0"/>
-              <a:t>Carr, M. H., and Paul D. Zwick. "Florida 2070: mapping Florida’s future—alternative patterns of development in 2070." </a:t>
-            </a:r>
-            <a:r>
-              <a:rPr lang="en-US" altLang="en-US" sz="2000" i="1" dirty="0"/>
-              <a:t>Gainesville: University of Florida </a:t>
-            </a:r>
-            <a:r>
-              <a:rPr lang="en-US" altLang="en-US" sz="2000" i="1" dirty="0" err="1"/>
-              <a:t>Geoplan</a:t>
-            </a:r>
-            <a:r>
-              <a:rPr lang="en-US" altLang="en-US" sz="2000" i="1" dirty="0"/>
-              <a:t> Center</a:t>
-            </a:r>
-            <a:r>
-              <a:rPr lang="en-US" altLang="en-US" sz="2000" dirty="0"/>
-              <a:t> (2016).</a:t>
-            </a:r>
-          </a:p>
-          <a:p>
-            <a:pPr>
-              <a:spcBef>
-                <a:spcPct val="50000"/>
-              </a:spcBef>
-            </a:pPr>
-            <a:endParaRPr lang="en-US" altLang="en-US" sz="2000" dirty="0"/>
-          </a:p>
-          <a:p>
-            <a:pPr>
-              <a:spcBef>
-                <a:spcPct val="50000"/>
-              </a:spcBef>
-            </a:pPr>
+              <a:rPr lang="en-US" altLang="en-US" sz="2000">
+                <a:highlight>
+                  <a:srgbClr val="FFFF00"/>
+                </a:highlight>
+              </a:rPr>
+              <a:t>Placeholder </a:t>
+            </a:r>
             <a:r>
               <a:rPr lang="en-US" altLang="en-US" sz="2000" dirty="0">
                 <a:highlight>
                   <a:srgbClr val="FFFF00"/>
                 </a:highlight>
               </a:rPr>
-              <a:t>Placeholder for FDOH </a:t>
+              <a:t>for FDOH </a:t>
             </a:r>
           </a:p>
         </p:txBody>
@@ -6857,182 +6830,6 @@
           </a:extLst>
         </p:spPr>
       </p:pic>
-      <p:pic>
-        <p:nvPicPr>
-          <p:cNvPr id="1045" name="Picture 6">
-            <a:extLst>
-              <a:ext uri="{FF2B5EF4-FFF2-40B4-BE49-F238E27FC236}">
-                <a16:creationId xmlns:a16="http://schemas.microsoft.com/office/drawing/2014/main" id="{F476E255-E6BE-43D6-9973-B61D753F00FC}"/>
-              </a:ext>
-            </a:extLst>
-          </p:cNvPr>
-          <p:cNvPicPr>
-            <a:picLocks noChangeAspect="1" noChangeArrowheads="1"/>
-          </p:cNvPicPr>
-          <p:nvPr/>
-        </p:nvPicPr>
-        <p:blipFill>
-          <a:blip r:embed="rId4">
-            <a:extLst>
-              <a:ext uri="{28A0092B-C50C-407E-A947-70E740481C1C}">
-                <a14:useLocalDpi xmlns:a14="http://schemas.microsoft.com/office/drawing/2010/main" val="0"/>
-              </a:ext>
-            </a:extLst>
-          </a:blip>
-          <a:srcRect/>
-          <a:stretch>
-            <a:fillRect/>
-          </a:stretch>
-        </p:blipFill>
-        <p:spPr bwMode="auto">
-          <a:xfrm>
-            <a:off x="609600" y="14119225"/>
-            <a:ext cx="5211763" cy="5211763"/>
-          </a:xfrm>
-          <a:prstGeom prst="rect">
-            <a:avLst/>
-          </a:prstGeom>
-          <a:noFill/>
-          <a:ln>
-            <a:noFill/>
-          </a:ln>
-          <a:extLst>
-            <a:ext uri="{909E8E84-426E-40DD-AFC4-6F175D3DCCD1}">
-              <a14:hiddenFill xmlns:a14="http://schemas.microsoft.com/office/drawing/2010/main">
-                <a:solidFill>
-                  <a:srgbClr val="FFFFFF"/>
-                </a:solidFill>
-              </a14:hiddenFill>
-            </a:ext>
-            <a:ext uri="{91240B29-F687-4F45-9708-019B960494DF}">
-              <a14:hiddenLine xmlns:a14="http://schemas.microsoft.com/office/drawing/2010/main" w="9525">
-                <a:solidFill>
-                  <a:srgbClr val="000000"/>
-                </a:solidFill>
-                <a:miter lim="800000"/>
-                <a:headEnd/>
-                <a:tailEnd/>
-              </a14:hiddenLine>
-            </a:ext>
-          </a:extLst>
-        </p:spPr>
-      </p:pic>
-      <p:pic>
-        <p:nvPicPr>
-          <p:cNvPr id="1046" name="Picture 8">
-            <a:extLst>
-              <a:ext uri="{FF2B5EF4-FFF2-40B4-BE49-F238E27FC236}">
-                <a16:creationId xmlns:a16="http://schemas.microsoft.com/office/drawing/2014/main" id="{0CF56934-C986-4BA4-906F-B530DA5BD22B}"/>
-              </a:ext>
-            </a:extLst>
-          </p:cNvPr>
-          <p:cNvPicPr>
-            <a:picLocks noChangeAspect="1" noChangeArrowheads="1"/>
-          </p:cNvPicPr>
-          <p:nvPr/>
-        </p:nvPicPr>
-        <p:blipFill>
-          <a:blip r:embed="rId5">
-            <a:extLst>
-              <a:ext uri="{28A0092B-C50C-407E-A947-70E740481C1C}">
-                <a14:useLocalDpi xmlns:a14="http://schemas.microsoft.com/office/drawing/2010/main" val="0"/>
-              </a:ext>
-            </a:extLst>
-          </a:blip>
-          <a:srcRect/>
-          <a:stretch>
-            <a:fillRect/>
-          </a:stretch>
-        </p:blipFill>
-        <p:spPr bwMode="auto">
-          <a:xfrm>
-            <a:off x="7205663" y="18353088"/>
-            <a:ext cx="5211762" cy="5211762"/>
-          </a:xfrm>
-          <a:prstGeom prst="rect">
-            <a:avLst/>
-          </a:prstGeom>
-          <a:noFill/>
-          <a:ln>
-            <a:noFill/>
-          </a:ln>
-          <a:extLst>
-            <a:ext uri="{909E8E84-426E-40DD-AFC4-6F175D3DCCD1}">
-              <a14:hiddenFill xmlns:a14="http://schemas.microsoft.com/office/drawing/2010/main">
-                <a:solidFill>
-                  <a:srgbClr val="FFFFFF"/>
-                </a:solidFill>
-              </a14:hiddenFill>
-            </a:ext>
-            <a:ext uri="{91240B29-F687-4F45-9708-019B960494DF}">
-              <a14:hiddenLine xmlns:a14="http://schemas.microsoft.com/office/drawing/2010/main" w="9525">
-                <a:solidFill>
-                  <a:srgbClr val="000000"/>
-                </a:solidFill>
-                <a:miter lim="800000"/>
-                <a:headEnd/>
-                <a:tailEnd/>
-              </a14:hiddenLine>
-            </a:ext>
-          </a:extLst>
-        </p:spPr>
-      </p:pic>
-      <p:sp>
-        <p:nvSpPr>
-          <p:cNvPr id="13" name="Arrow: Bent 12">
-            <a:extLst>
-              <a:ext uri="{FF2B5EF4-FFF2-40B4-BE49-F238E27FC236}">
-                <a16:creationId xmlns:a16="http://schemas.microsoft.com/office/drawing/2014/main" id="{D57C576D-98EF-445F-9313-E2CD8229CDB1}"/>
-              </a:ext>
-            </a:extLst>
-          </p:cNvPr>
-          <p:cNvSpPr/>
-          <p:nvPr/>
-        </p:nvSpPr>
-        <p:spPr bwMode="auto">
-          <a:xfrm rot="5400000">
-            <a:off x="7289006" y="15494794"/>
-            <a:ext cx="2414588" cy="2971800"/>
-          </a:xfrm>
-          <a:prstGeom prst="bentArrow">
-            <a:avLst/>
-          </a:prstGeom>
-          <a:solidFill>
-            <a:schemeClr val="accent1"/>
-          </a:solidFill>
-          <a:ln w="9525" cap="flat" cmpd="sng" algn="ctr">
-            <a:solidFill>
-              <a:schemeClr val="tx1"/>
-            </a:solidFill>
-            <a:prstDash val="solid"/>
-            <a:round/>
-            <a:headEnd type="none" w="med" len="med"/>
-            <a:tailEnd type="none" w="med" len="med"/>
-          </a:ln>
-          <a:effectLst/>
-          <a:extLst>
-            <a:ext uri="{AF507438-7753-43E0-B8FC-AC1667EBCBE1}">
-              <a14:hiddenEffects xmlns:a14="http://schemas.microsoft.com/office/drawing/2010/main">
-                <a:effectLst>
-                  <a:outerShdw dist="35921" dir="2700000" algn="ctr" rotWithShape="0">
-                    <a:schemeClr val="bg2"/>
-                  </a:outerShdw>
-                </a:effectLst>
-              </a14:hiddenEffects>
-            </a:ext>
-          </a:extLst>
-        </p:spPr>
-        <p:txBody>
-          <a:bodyPr/>
-          <a:lstStyle/>
-          <a:p>
-            <a:pPr>
-              <a:defRPr/>
-            </a:pPr>
-            <a:endParaRPr lang="en-US"/>
-          </a:p>
-        </p:txBody>
-      </p:sp>
       <p:sp>
         <p:nvSpPr>
           <p:cNvPr id="1048" name="TextBox 13">
@@ -7218,22 +7015,21 @@
           <p:nvPr/>
         </p:nvPicPr>
         <p:blipFill>
-          <a:blip r:embed="rId6">
+          <a:blip r:embed="rId4">
             <a:extLst>
               <a:ext uri="{28A0092B-C50C-407E-A947-70E740481C1C}">
                 <a14:useLocalDpi xmlns:a14="http://schemas.microsoft.com/office/drawing/2010/main" val="0"/>
               </a:ext>
             </a:extLst>
           </a:blip>
-          <a:srcRect/>
           <a:stretch>
             <a:fillRect/>
           </a:stretch>
         </p:blipFill>
         <p:spPr bwMode="auto">
           <a:xfrm>
-            <a:off x="14954033" y="19849306"/>
-            <a:ext cx="7971589" cy="7029510"/>
+            <a:off x="14954033" y="20110171"/>
+            <a:ext cx="7829767" cy="6391999"/>
           </a:xfrm>
           <a:prstGeom prst="rect">
             <a:avLst/>
@@ -7278,22 +7074,21 @@
           <p:nvPr/>
         </p:nvPicPr>
         <p:blipFill>
-          <a:blip r:embed="rId7">
+          <a:blip r:embed="rId5">
             <a:extLst>
               <a:ext uri="{28A0092B-C50C-407E-A947-70E740481C1C}">
                 <a14:useLocalDpi xmlns:a14="http://schemas.microsoft.com/office/drawing/2010/main" val="0"/>
               </a:ext>
             </a:extLst>
           </a:blip>
-          <a:srcRect/>
           <a:stretch>
             <a:fillRect/>
           </a:stretch>
         </p:blipFill>
         <p:spPr bwMode="auto">
           <a:xfrm>
-            <a:off x="37676141" y="14877404"/>
-            <a:ext cx="5917818" cy="5211763"/>
+            <a:off x="36918052" y="15187580"/>
+            <a:ext cx="6675907" cy="5179582"/>
           </a:xfrm>
           <a:prstGeom prst="rect">
             <a:avLst/>
@@ -7338,7 +7133,7 @@
           <p:nvPr/>
         </p:nvPicPr>
         <p:blipFill>
-          <a:blip r:embed="rId8">
+          <a:blip r:embed="rId6">
             <a:extLst>
               <a:ext uri="{28A0092B-C50C-407E-A947-70E740481C1C}">
                 <a14:useLocalDpi xmlns:a14="http://schemas.microsoft.com/office/drawing/2010/main" val="0"/>
@@ -7398,7 +7193,7 @@
           <p:nvPr/>
         </p:nvPicPr>
         <p:blipFill>
-          <a:blip r:embed="rId9">
+          <a:blip r:embed="rId7">
             <a:extLst>
               <a:ext uri="{28A0092B-C50C-407E-A947-70E740481C1C}">
                 <a14:useLocalDpi xmlns:a14="http://schemas.microsoft.com/office/drawing/2010/main" val="0"/>
@@ -7808,10 +7603,10 @@
         </p:nvGrpSpPr>
         <p:grpSpPr>
           <a:xfrm>
-            <a:off x="22496787" y="25416173"/>
-            <a:ext cx="7526013" cy="7152898"/>
-            <a:chOff x="14401800" y="26066749"/>
-            <a:chExt cx="7011988" cy="6663321"/>
+            <a:off x="22497055" y="25416173"/>
+            <a:ext cx="7525476" cy="7152898"/>
+            <a:chOff x="14402050" y="26066749"/>
+            <a:chExt cx="7011488" cy="6663321"/>
           </a:xfrm>
         </p:grpSpPr>
         <p:pic>
@@ -7829,22 +7624,21 @@
             <p:nvPr/>
           </p:nvPicPr>
           <p:blipFill>
-            <a:blip r:embed="rId10">
+            <a:blip r:embed="rId8">
               <a:extLst>
                 <a:ext uri="{28A0092B-C50C-407E-A947-70E740481C1C}">
                   <a14:useLocalDpi xmlns:a14="http://schemas.microsoft.com/office/drawing/2010/main" val="0"/>
                 </a:ext>
               </a:extLst>
             </a:blip>
-            <a:srcRect/>
             <a:stretch>
               <a:fillRect/>
             </a:stretch>
           </p:blipFill>
           <p:spPr bwMode="auto">
             <a:xfrm>
-              <a:off x="14401800" y="26066749"/>
-              <a:ext cx="7011988" cy="6181725"/>
+              <a:off x="14402050" y="26066749"/>
+              <a:ext cx="7011488" cy="6181725"/>
             </a:xfrm>
             <a:prstGeom prst="rect">
               <a:avLst/>

</xml_diff>